<commit_message>
String Notes added for More Topics.
</commit_message>
<xml_diff>
--- a/CoreJava/12_Miscellaenous/3_String/String_ppt.pptx
+++ b/CoreJava/12_Miscellaenous/3_String/String_ppt.pptx
@@ -105,6 +105,11 @@
       </a:defRPr>
     </a:lvl9pPr>
   </p:defaultTextStyle>
+  <p:extLst>
+    <p:ext uri="{EFAFB233-063F-42B5-8137-9DF3F51BA10A}">
+      <p15:sldGuideLst xmlns:p15="http://schemas.microsoft.com/office/powerpoint/2012/main"/>
+    </p:ext>
+  </p:extLst>
 </p:presentation>
 </file>
 
@@ -3422,7 +3427,7 @@
           <p:nvPr>
             <p:extLst>
               <p:ext uri="{D42A27DB-BD31-4B8C-83A1-F6EECF244321}">
-                <p14:modId xmlns:p14="http://schemas.microsoft.com/office/powerpoint/2010/main" val="3420183114"/>
+                <p14:modId xmlns:p14="http://schemas.microsoft.com/office/powerpoint/2010/main" val="1715808030"/>
               </p:ext>
             </p:extLst>
           </p:nvPr>
@@ -3462,7 +3467,7 @@
                       <a:pPr algn="ctr"/>
                       <a:r>
                         <a:rPr lang="en-US" sz="1200" dirty="0"/>
-                        <a:t>new </a:t>
+                        <a:t>Without new </a:t>
                       </a:r>
                       <a:r>
                         <a:rPr lang="en-US" sz="1200" dirty="0" err="1"/>
@@ -3485,7 +3490,7 @@
                       <a:pPr algn="ctr"/>
                       <a:r>
                         <a:rPr lang="en-US" sz="1200" b="1" i="1" dirty="0"/>
-                        <a:t>Without new() keyword</a:t>
+                        <a:t>new() keyword</a:t>
                       </a:r>
                       <a:endParaRPr lang="en-IN" sz="1200" b="1" i="1" dirty="0"/>
                     </a:p>

</xml_diff>

<commit_message>
Added Notes on Different Topics.
</commit_message>
<xml_diff>
--- a/CoreJava/12_Miscellaenous/3_String/String_ppt.pptx
+++ b/CoreJava/12_Miscellaenous/3_String/String_ppt.pptx
@@ -7,6 +7,8 @@
   <p:sldIdLst>
     <p:sldId id="256" r:id="rId2"/>
     <p:sldId id="258" r:id="rId3"/>
+    <p:sldId id="259" r:id="rId4"/>
+    <p:sldId id="261" r:id="rId5"/>
   </p:sldIdLst>
   <p:sldSz cx="12192000" cy="6858000"/>
   <p:notesSz cx="6858000" cy="9144000"/>
@@ -262,7 +264,7 @@
           <a:p>
             <a:fld id="{CB1A4E68-2456-4826-8F18-863E7D8F406A}" type="datetimeFigureOut">
               <a:rPr lang="en-IN" smtClean="0"/>
-              <a:t>25-09-2023</a:t>
+              <a:t>30-09-2023</a:t>
             </a:fld>
             <a:endParaRPr lang="en-IN"/>
           </a:p>
@@ -462,7 +464,7 @@
           <a:p>
             <a:fld id="{CB1A4E68-2456-4826-8F18-863E7D8F406A}" type="datetimeFigureOut">
               <a:rPr lang="en-IN" smtClean="0"/>
-              <a:t>25-09-2023</a:t>
+              <a:t>30-09-2023</a:t>
             </a:fld>
             <a:endParaRPr lang="en-IN"/>
           </a:p>
@@ -672,7 +674,7 @@
           <a:p>
             <a:fld id="{CB1A4E68-2456-4826-8F18-863E7D8F406A}" type="datetimeFigureOut">
               <a:rPr lang="en-IN" smtClean="0"/>
-              <a:t>25-09-2023</a:t>
+              <a:t>30-09-2023</a:t>
             </a:fld>
             <a:endParaRPr lang="en-IN"/>
           </a:p>
@@ -872,7 +874,7 @@
           <a:p>
             <a:fld id="{CB1A4E68-2456-4826-8F18-863E7D8F406A}" type="datetimeFigureOut">
               <a:rPr lang="en-IN" smtClean="0"/>
-              <a:t>25-09-2023</a:t>
+              <a:t>30-09-2023</a:t>
             </a:fld>
             <a:endParaRPr lang="en-IN"/>
           </a:p>
@@ -1148,7 +1150,7 @@
           <a:p>
             <a:fld id="{CB1A4E68-2456-4826-8F18-863E7D8F406A}" type="datetimeFigureOut">
               <a:rPr lang="en-IN" smtClean="0"/>
-              <a:t>25-09-2023</a:t>
+              <a:t>30-09-2023</a:t>
             </a:fld>
             <a:endParaRPr lang="en-IN"/>
           </a:p>
@@ -1416,7 +1418,7 @@
           <a:p>
             <a:fld id="{CB1A4E68-2456-4826-8F18-863E7D8F406A}" type="datetimeFigureOut">
               <a:rPr lang="en-IN" smtClean="0"/>
-              <a:t>25-09-2023</a:t>
+              <a:t>30-09-2023</a:t>
             </a:fld>
             <a:endParaRPr lang="en-IN"/>
           </a:p>
@@ -1831,7 +1833,7 @@
           <a:p>
             <a:fld id="{CB1A4E68-2456-4826-8F18-863E7D8F406A}" type="datetimeFigureOut">
               <a:rPr lang="en-IN" smtClean="0"/>
-              <a:t>25-09-2023</a:t>
+              <a:t>30-09-2023</a:t>
             </a:fld>
             <a:endParaRPr lang="en-IN"/>
           </a:p>
@@ -1973,7 +1975,7 @@
           <a:p>
             <a:fld id="{CB1A4E68-2456-4826-8F18-863E7D8F406A}" type="datetimeFigureOut">
               <a:rPr lang="en-IN" smtClean="0"/>
-              <a:t>25-09-2023</a:t>
+              <a:t>30-09-2023</a:t>
             </a:fld>
             <a:endParaRPr lang="en-IN"/>
           </a:p>
@@ -2086,7 +2088,7 @@
           <a:p>
             <a:fld id="{CB1A4E68-2456-4826-8F18-863E7D8F406A}" type="datetimeFigureOut">
               <a:rPr lang="en-IN" smtClean="0"/>
-              <a:t>25-09-2023</a:t>
+              <a:t>30-09-2023</a:t>
             </a:fld>
             <a:endParaRPr lang="en-IN"/>
           </a:p>
@@ -2399,7 +2401,7 @@
           <a:p>
             <a:fld id="{CB1A4E68-2456-4826-8F18-863E7D8F406A}" type="datetimeFigureOut">
               <a:rPr lang="en-IN" smtClean="0"/>
-              <a:t>25-09-2023</a:t>
+              <a:t>30-09-2023</a:t>
             </a:fld>
             <a:endParaRPr lang="en-IN"/>
           </a:p>
@@ -2688,7 +2690,7 @@
           <a:p>
             <a:fld id="{CB1A4E68-2456-4826-8F18-863E7D8F406A}" type="datetimeFigureOut">
               <a:rPr lang="en-IN" smtClean="0"/>
-              <a:t>25-09-2023</a:t>
+              <a:t>30-09-2023</a:t>
             </a:fld>
             <a:endParaRPr lang="en-IN"/>
           </a:p>
@@ -2931,7 +2933,7 @@
           <a:p>
             <a:fld id="{CB1A4E68-2456-4826-8F18-863E7D8F406A}" type="datetimeFigureOut">
               <a:rPr lang="en-IN" smtClean="0"/>
-              <a:t>25-09-2023</a:t>
+              <a:t>30-09-2023</a:t>
             </a:fld>
             <a:endParaRPr lang="en-IN"/>
           </a:p>
@@ -4973,6 +4975,1137 @@
 </p:sld>
 </file>
 
+<file path=ppt/slides/slide3.xml><?xml version="1.0" encoding="utf-8"?>
+<p:sld xmlns:a="http://schemas.openxmlformats.org/drawingml/2006/main" xmlns:r="http://schemas.openxmlformats.org/officeDocument/2006/relationships" xmlns:p="http://schemas.openxmlformats.org/presentationml/2006/main">
+  <p:cSld>
+    <p:spTree>
+      <p:nvGrpSpPr>
+        <p:cNvPr id="1" name=""/>
+        <p:cNvGrpSpPr/>
+        <p:nvPr/>
+      </p:nvGrpSpPr>
+      <p:grpSpPr>
+        <a:xfrm>
+          <a:off x="0" y="0"/>
+          <a:ext cx="0" cy="0"/>
+          <a:chOff x="0" y="0"/>
+          <a:chExt cx="0" cy="0"/>
+        </a:xfrm>
+      </p:grpSpPr>
+      <p:sp>
+        <p:nvSpPr>
+          <p:cNvPr id="2" name="Title 1">
+            <a:extLst>
+              <a:ext uri="{FF2B5EF4-FFF2-40B4-BE49-F238E27FC236}">
+                <a16:creationId xmlns:a16="http://schemas.microsoft.com/office/drawing/2014/main" id="{824D5CE3-A749-99B3-9544-FED368B1EFD0}"/>
+              </a:ext>
+            </a:extLst>
+          </p:cNvPr>
+          <p:cNvSpPr>
+            <a:spLocks noGrp="1"/>
+          </p:cNvSpPr>
+          <p:nvPr>
+            <p:ph type="title"/>
+          </p:nvPr>
+        </p:nvSpPr>
+        <p:spPr>
+          <a:xfrm>
+            <a:off x="838200" y="365126"/>
+            <a:ext cx="10515600" cy="407232"/>
+          </a:xfrm>
+        </p:spPr>
+        <p:txBody>
+          <a:bodyPr>
+            <a:normAutofit/>
+          </a:bodyPr>
+          <a:lstStyle/>
+          <a:p>
+            <a:pPr algn="ctr"/>
+            <a:r>
+              <a:rPr lang="en-US" sz="2000" b="1" dirty="0"/>
+              <a:t>String, String Buffer ,String Builder</a:t>
+            </a:r>
+            <a:endParaRPr lang="en-IN" sz="2000" b="1" dirty="0"/>
+          </a:p>
+        </p:txBody>
+      </p:sp>
+      <p:graphicFrame>
+        <p:nvGraphicFramePr>
+          <p:cNvPr id="4" name="Table 4">
+            <a:extLst>
+              <a:ext uri="{FF2B5EF4-FFF2-40B4-BE49-F238E27FC236}">
+                <a16:creationId xmlns:a16="http://schemas.microsoft.com/office/drawing/2014/main" id="{A1F014A3-53A1-019D-1448-C01C53D14DAC}"/>
+              </a:ext>
+            </a:extLst>
+          </p:cNvPr>
+          <p:cNvGraphicFramePr>
+            <a:graphicFrameLocks noGrp="1"/>
+          </p:cNvGraphicFramePr>
+          <p:nvPr>
+            <p:ph idx="1"/>
+            <p:extLst>
+              <p:ext uri="{D42A27DB-BD31-4B8C-83A1-F6EECF244321}">
+                <p14:modId xmlns:p14="http://schemas.microsoft.com/office/powerpoint/2010/main" val="1470854443"/>
+              </p:ext>
+            </p:extLst>
+          </p:nvPr>
+        </p:nvGraphicFramePr>
+        <p:xfrm>
+          <a:off x="918100" y="772358"/>
+          <a:ext cx="9965925" cy="5577840"/>
+        </p:xfrm>
+        <a:graphic>
+          <a:graphicData uri="http://schemas.openxmlformats.org/drawingml/2006/table">
+            <a:tbl>
+              <a:tblPr firstRow="1" bandRow="1">
+                <a:tableStyleId>{5C22544A-7EE6-4342-B048-85BDC9FD1C3A}</a:tableStyleId>
+              </a:tblPr>
+              <a:tblGrid>
+                <a:gridCol w="3321975">
+                  <a:extLst>
+                    <a:ext uri="{9D8B030D-6E8A-4147-A177-3AD203B41FA5}">
+                      <a16:colId xmlns:a16="http://schemas.microsoft.com/office/drawing/2014/main" val="3425101313"/>
+                    </a:ext>
+                  </a:extLst>
+                </a:gridCol>
+                <a:gridCol w="3321975">
+                  <a:extLst>
+                    <a:ext uri="{9D8B030D-6E8A-4147-A177-3AD203B41FA5}">
+                      <a16:colId xmlns:a16="http://schemas.microsoft.com/office/drawing/2014/main" val="1683869864"/>
+                    </a:ext>
+                  </a:extLst>
+                </a:gridCol>
+                <a:gridCol w="3321975">
+                  <a:extLst>
+                    <a:ext uri="{9D8B030D-6E8A-4147-A177-3AD203B41FA5}">
+                      <a16:colId xmlns:a16="http://schemas.microsoft.com/office/drawing/2014/main" val="3220010055"/>
+                    </a:ext>
+                  </a:extLst>
+                </a:gridCol>
+              </a:tblGrid>
+              <a:tr h="318536">
+                <a:tc>
+                  <a:txBody>
+                    <a:bodyPr/>
+                    <a:lstStyle/>
+                    <a:p>
+                      <a:pPr algn="ctr"/>
+                      <a:r>
+                        <a:rPr lang="en-US" dirty="0"/>
+                        <a:t>String </a:t>
+                      </a:r>
+                      <a:endParaRPr lang="en-IN" dirty="0"/>
+                    </a:p>
+                  </a:txBody>
+                  <a:tcPr/>
+                </a:tc>
+                <a:tc>
+                  <a:txBody>
+                    <a:bodyPr/>
+                    <a:lstStyle/>
+                    <a:p>
+                      <a:pPr algn="ctr"/>
+                      <a:r>
+                        <a:rPr lang="en-US" dirty="0"/>
+                        <a:t>String Buffer</a:t>
+                      </a:r>
+                      <a:endParaRPr lang="en-IN" dirty="0"/>
+                    </a:p>
+                  </a:txBody>
+                  <a:tcPr/>
+                </a:tc>
+                <a:tc>
+                  <a:txBody>
+                    <a:bodyPr/>
+                    <a:lstStyle/>
+                    <a:p>
+                      <a:pPr algn="ctr"/>
+                      <a:r>
+                        <a:rPr lang="en-US" dirty="0"/>
+                        <a:t>String Builder</a:t>
+                      </a:r>
+                      <a:endParaRPr lang="en-IN" dirty="0"/>
+                    </a:p>
+                  </a:txBody>
+                  <a:tcPr/>
+                </a:tc>
+                <a:extLst>
+                  <a:ext uri="{0D108BD9-81ED-4DB2-BD59-A6C34878D82A}">
+                    <a16:rowId xmlns:a16="http://schemas.microsoft.com/office/drawing/2014/main" val="1142740357"/>
+                  </a:ext>
+                </a:extLst>
+              </a:tr>
+              <a:tr h="318536">
+                <a:tc>
+                  <a:txBody>
+                    <a:bodyPr/>
+                    <a:lstStyle/>
+                    <a:p>
+                      <a:pPr algn="ctr"/>
+                      <a:r>
+                        <a:rPr lang="en-US" dirty="0"/>
+                        <a:t>Immutable cannot be changed</a:t>
+                      </a:r>
+                      <a:endParaRPr lang="en-IN" dirty="0"/>
+                    </a:p>
+                  </a:txBody>
+                  <a:tcPr/>
+                </a:tc>
+                <a:tc>
+                  <a:txBody>
+                    <a:bodyPr/>
+                    <a:lstStyle/>
+                    <a:p>
+                      <a:pPr algn="ctr"/>
+                      <a:r>
+                        <a:rPr lang="en-US" dirty="0"/>
+                        <a:t>Mutable we can change</a:t>
+                      </a:r>
+                      <a:endParaRPr lang="en-IN" dirty="0"/>
+                    </a:p>
+                  </a:txBody>
+                  <a:tcPr/>
+                </a:tc>
+                <a:tc>
+                  <a:txBody>
+                    <a:bodyPr/>
+                    <a:lstStyle/>
+                    <a:p>
+                      <a:pPr algn="ctr"/>
+                      <a:r>
+                        <a:rPr lang="en-US" dirty="0"/>
+                        <a:t>Mutable we can change</a:t>
+                      </a:r>
+                      <a:endParaRPr lang="en-IN" dirty="0"/>
+                    </a:p>
+                  </a:txBody>
+                  <a:tcPr/>
+                </a:tc>
+                <a:extLst>
+                  <a:ext uri="{0D108BD9-81ED-4DB2-BD59-A6C34878D82A}">
+                    <a16:rowId xmlns:a16="http://schemas.microsoft.com/office/drawing/2014/main" val="3560707859"/>
+                  </a:ext>
+                </a:extLst>
+              </a:tr>
+              <a:tr h="318536">
+                <a:tc>
+                  <a:txBody>
+                    <a:bodyPr/>
+                    <a:lstStyle/>
+                    <a:p>
+                      <a:pPr algn="ctr"/>
+                      <a:r>
+                        <a:rPr lang="en-US" dirty="0"/>
+                        <a:t>Have concat() method</a:t>
+                      </a:r>
+                      <a:endParaRPr lang="en-IN" dirty="0"/>
+                    </a:p>
+                  </a:txBody>
+                  <a:tcPr/>
+                </a:tc>
+                <a:tc>
+                  <a:txBody>
+                    <a:bodyPr/>
+                    <a:lstStyle/>
+                    <a:p>
+                      <a:pPr algn="ctr"/>
+                      <a:r>
+                        <a:rPr lang="en-US" dirty="0"/>
+                        <a:t>have append() method</a:t>
+                      </a:r>
+                      <a:endParaRPr lang="en-IN" dirty="0"/>
+                    </a:p>
+                  </a:txBody>
+                  <a:tcPr/>
+                </a:tc>
+                <a:tc>
+                  <a:txBody>
+                    <a:bodyPr/>
+                    <a:lstStyle/>
+                    <a:p>
+                      <a:pPr marL="0" marR="0" lvl="0" indent="0" algn="ctr" defTabSz="914400" rtl="0" eaLnBrk="1" fontAlgn="auto" latinLnBrk="0" hangingPunct="1">
+                        <a:lnSpc>
+                          <a:spcPct val="100000"/>
+                        </a:lnSpc>
+                        <a:spcBef>
+                          <a:spcPts val="0"/>
+                        </a:spcBef>
+                        <a:spcAft>
+                          <a:spcPts val="0"/>
+                        </a:spcAft>
+                        <a:buClrTx/>
+                        <a:buSzTx/>
+                        <a:buFontTx/>
+                        <a:buNone/>
+                        <a:tabLst/>
+                        <a:defRPr/>
+                      </a:pPr>
+                      <a:r>
+                        <a:rPr lang="en-US" dirty="0"/>
+                        <a:t>have append() method</a:t>
+                      </a:r>
+                      <a:endParaRPr lang="en-IN" dirty="0"/>
+                    </a:p>
+                  </a:txBody>
+                  <a:tcPr/>
+                </a:tc>
+                <a:extLst>
+                  <a:ext uri="{0D108BD9-81ED-4DB2-BD59-A6C34878D82A}">
+                    <a16:rowId xmlns:a16="http://schemas.microsoft.com/office/drawing/2014/main" val="3382898447"/>
+                  </a:ext>
+                </a:extLst>
+              </a:tr>
+              <a:tr h="796340">
+                <a:tc>
+                  <a:txBody>
+                    <a:bodyPr/>
+                    <a:lstStyle/>
+                    <a:p>
+                      <a:r>
+                        <a:rPr lang="en-US" dirty="0"/>
+                        <a:t>.equals() method meant for content comparison.</a:t>
+                      </a:r>
+                      <a:endParaRPr lang="en-IN" dirty="0"/>
+                    </a:p>
+                  </a:txBody>
+                  <a:tcPr/>
+                </a:tc>
+                <a:tc>
+                  <a:txBody>
+                    <a:bodyPr/>
+                    <a:lstStyle/>
+                    <a:p>
+                      <a:pPr marL="0" marR="0" lvl="0" indent="0" algn="l" defTabSz="914400" rtl="0" eaLnBrk="1" fontAlgn="auto" latinLnBrk="0" hangingPunct="1">
+                        <a:lnSpc>
+                          <a:spcPct val="100000"/>
+                        </a:lnSpc>
+                        <a:spcBef>
+                          <a:spcPts val="0"/>
+                        </a:spcBef>
+                        <a:spcAft>
+                          <a:spcPts val="0"/>
+                        </a:spcAft>
+                        <a:buClrTx/>
+                        <a:buSzTx/>
+                        <a:buFontTx/>
+                        <a:buNone/>
+                        <a:tabLst/>
+                        <a:defRPr/>
+                      </a:pPr>
+                      <a:r>
+                        <a:rPr lang="en-US" dirty="0"/>
+                        <a:t>.equals() method meant for reference/address comparison.</a:t>
+                      </a:r>
+                      <a:endParaRPr lang="en-IN" dirty="0"/>
+                    </a:p>
+                    <a:p>
+                      <a:endParaRPr lang="en-IN" dirty="0"/>
+                    </a:p>
+                  </a:txBody>
+                  <a:tcPr/>
+                </a:tc>
+                <a:tc>
+                  <a:txBody>
+                    <a:bodyPr/>
+                    <a:lstStyle/>
+                    <a:p>
+                      <a:pPr marL="0" marR="0" lvl="0" indent="0" algn="l" defTabSz="914400" rtl="0" eaLnBrk="1" fontAlgn="auto" latinLnBrk="0" hangingPunct="1">
+                        <a:lnSpc>
+                          <a:spcPct val="100000"/>
+                        </a:lnSpc>
+                        <a:spcBef>
+                          <a:spcPts val="0"/>
+                        </a:spcBef>
+                        <a:spcAft>
+                          <a:spcPts val="0"/>
+                        </a:spcAft>
+                        <a:buClrTx/>
+                        <a:buSzTx/>
+                        <a:buFontTx/>
+                        <a:buNone/>
+                        <a:tabLst/>
+                        <a:defRPr/>
+                      </a:pPr>
+                      <a:r>
+                        <a:rPr lang="en-US" dirty="0"/>
+                        <a:t>equals() method meant for reference/address comparison.</a:t>
+                      </a:r>
+                      <a:endParaRPr lang="en-IN" dirty="0"/>
+                    </a:p>
+                    <a:p>
+                      <a:endParaRPr lang="en-IN" dirty="0"/>
+                    </a:p>
+                  </a:txBody>
+                  <a:tcPr/>
+                </a:tc>
+                <a:extLst>
+                  <a:ext uri="{0D108BD9-81ED-4DB2-BD59-A6C34878D82A}">
+                    <a16:rowId xmlns:a16="http://schemas.microsoft.com/office/drawing/2014/main" val="2801532861"/>
+                  </a:ext>
+                </a:extLst>
+              </a:tr>
+              <a:tr h="796340">
+                <a:tc>
+                  <a:txBody>
+                    <a:bodyPr/>
+                    <a:lstStyle/>
+                    <a:p>
+                      <a:r>
+                        <a:rPr lang="en-US" dirty="0"/>
+                        <a:t>Not used in Multithreading concept more as its immutable and value cannot be changed.</a:t>
+                      </a:r>
+                      <a:endParaRPr lang="en-IN" dirty="0"/>
+                    </a:p>
+                  </a:txBody>
+                  <a:tcPr/>
+                </a:tc>
+                <a:tc>
+                  <a:txBody>
+                    <a:bodyPr/>
+                    <a:lstStyle/>
+                    <a:p>
+                      <a:endParaRPr lang="en-IN" dirty="0"/>
+                    </a:p>
+                  </a:txBody>
+                  <a:tcPr/>
+                </a:tc>
+                <a:tc>
+                  <a:txBody>
+                    <a:bodyPr/>
+                    <a:lstStyle/>
+                    <a:p>
+                      <a:endParaRPr lang="en-IN"/>
+                    </a:p>
+                  </a:txBody>
+                  <a:tcPr/>
+                </a:tc>
+                <a:extLst>
+                  <a:ext uri="{0D108BD9-81ED-4DB2-BD59-A6C34878D82A}">
+                    <a16:rowId xmlns:a16="http://schemas.microsoft.com/office/drawing/2014/main" val="3800285930"/>
+                  </a:ext>
+                </a:extLst>
+              </a:tr>
+              <a:tr h="1035242">
+                <a:tc>
+                  <a:txBody>
+                    <a:bodyPr/>
+                    <a:lstStyle/>
+                    <a:p>
+                      <a:pPr algn="l"/>
+                      <a:r>
+                        <a:rPr lang="en-US" dirty="0"/>
+                        <a:t>Strings are inherently thread-safe because they are immutable. Multiple threads can safely access and share string objects without the need for explicit synchronization</a:t>
+                      </a:r>
+                      <a:endParaRPr lang="en-IN" dirty="0"/>
+                    </a:p>
+                  </a:txBody>
+                  <a:tcPr/>
+                </a:tc>
+                <a:tc>
+                  <a:txBody>
+                    <a:bodyPr/>
+                    <a:lstStyle/>
+                    <a:p>
+                      <a:r>
+                        <a:rPr lang="en-US" dirty="0"/>
+                        <a:t>Every method in String buffer is synchronized.</a:t>
+                      </a:r>
+                      <a:br>
+                        <a:rPr lang="en-US" dirty="0"/>
+                      </a:br>
+                      <a:r>
+                        <a:rPr lang="en-US" dirty="0" err="1"/>
+                        <a:t>i.e</a:t>
+                      </a:r>
+                      <a:r>
+                        <a:rPr lang="en-US" dirty="0"/>
+                        <a:t> at a time only one Thread can access it.</a:t>
+                      </a:r>
+                      <a:endParaRPr lang="en-IN" dirty="0"/>
+                    </a:p>
+                  </a:txBody>
+                  <a:tcPr/>
+                </a:tc>
+                <a:tc>
+                  <a:txBody>
+                    <a:bodyPr/>
+                    <a:lstStyle/>
+                    <a:p>
+                      <a:pPr marL="0" marR="0" lvl="0" indent="0" algn="l" defTabSz="914400" rtl="0" eaLnBrk="1" fontAlgn="auto" latinLnBrk="0" hangingPunct="1">
+                        <a:lnSpc>
+                          <a:spcPct val="100000"/>
+                        </a:lnSpc>
+                        <a:spcBef>
+                          <a:spcPts val="0"/>
+                        </a:spcBef>
+                        <a:spcAft>
+                          <a:spcPts val="0"/>
+                        </a:spcAft>
+                        <a:buClrTx/>
+                        <a:buSzTx/>
+                        <a:buFontTx/>
+                        <a:buNone/>
+                        <a:tabLst/>
+                        <a:defRPr/>
+                      </a:pPr>
+                      <a:r>
+                        <a:rPr lang="en-US" dirty="0"/>
+                        <a:t>No method in String Builder is synchronized</a:t>
+                      </a:r>
+                      <a:endParaRPr lang="en-IN" dirty="0"/>
+                    </a:p>
+                    <a:p>
+                      <a:r>
+                        <a:rPr lang="en-IN" dirty="0" err="1"/>
+                        <a:t>i.e</a:t>
+                      </a:r>
+                      <a:r>
+                        <a:rPr lang="en-IN" dirty="0"/>
+                        <a:t> at a time multiple Thread can access it</a:t>
+                      </a:r>
+                    </a:p>
+                  </a:txBody>
+                  <a:tcPr/>
+                </a:tc>
+                <a:extLst>
+                  <a:ext uri="{0D108BD9-81ED-4DB2-BD59-A6C34878D82A}">
+                    <a16:rowId xmlns:a16="http://schemas.microsoft.com/office/drawing/2014/main" val="2160489687"/>
+                  </a:ext>
+                </a:extLst>
+              </a:tr>
+              <a:tr h="796340">
+                <a:tc>
+                  <a:txBody>
+                    <a:bodyPr/>
+                    <a:lstStyle/>
+                    <a:p>
+                      <a:r>
+                        <a:rPr lang="en-US" dirty="0"/>
+                        <a:t>Slow </a:t>
+                      </a:r>
+                      <a:endParaRPr lang="en-IN" dirty="0"/>
+                    </a:p>
+                  </a:txBody>
+                  <a:tcPr/>
+                </a:tc>
+                <a:tc>
+                  <a:txBody>
+                    <a:bodyPr/>
+                    <a:lstStyle/>
+                    <a:p>
+                      <a:r>
+                        <a:rPr lang="en-US" dirty="0"/>
+                        <a:t>Slow Performance, Because Thread has to wait to operate on StringBuffer Object.</a:t>
+                      </a:r>
+                      <a:endParaRPr lang="en-IN" dirty="0"/>
+                    </a:p>
+                  </a:txBody>
+                  <a:tcPr/>
+                </a:tc>
+                <a:tc>
+                  <a:txBody>
+                    <a:bodyPr/>
+                    <a:lstStyle/>
+                    <a:p>
+                      <a:r>
+                        <a:rPr lang="en-US" dirty="0"/>
+                        <a:t>High performance, Because Thread don t need to wait on StringBuilder </a:t>
+                      </a:r>
+                      <a:r>
+                        <a:rPr lang="en-US" dirty="0" err="1"/>
+                        <a:t>Objcet</a:t>
+                      </a:r>
+                      <a:r>
+                        <a:rPr lang="en-US" dirty="0"/>
+                        <a:t>.</a:t>
+                      </a:r>
+                      <a:endParaRPr lang="en-IN" dirty="0"/>
+                    </a:p>
+                  </a:txBody>
+                  <a:tcPr/>
+                </a:tc>
+                <a:extLst>
+                  <a:ext uri="{0D108BD9-81ED-4DB2-BD59-A6C34878D82A}">
+                    <a16:rowId xmlns:a16="http://schemas.microsoft.com/office/drawing/2014/main" val="461439749"/>
+                  </a:ext>
+                </a:extLst>
+              </a:tr>
+            </a:tbl>
+          </a:graphicData>
+        </a:graphic>
+      </p:graphicFrame>
+    </p:spTree>
+    <p:extLst>
+      <p:ext uri="{BB962C8B-B14F-4D97-AF65-F5344CB8AC3E}">
+        <p14:creationId xmlns:p14="http://schemas.microsoft.com/office/powerpoint/2010/main" val="3675093583"/>
+      </p:ext>
+    </p:extLst>
+  </p:cSld>
+  <p:clrMapOvr>
+    <a:masterClrMapping/>
+  </p:clrMapOvr>
+</p:sld>
+</file>
+
+<file path=ppt/slides/slide4.xml><?xml version="1.0" encoding="utf-8"?>
+<p:sld xmlns:a="http://schemas.openxmlformats.org/drawingml/2006/main" xmlns:r="http://schemas.openxmlformats.org/officeDocument/2006/relationships" xmlns:p="http://schemas.openxmlformats.org/presentationml/2006/main">
+  <p:cSld>
+    <p:spTree>
+      <p:nvGrpSpPr>
+        <p:cNvPr id="1" name=""/>
+        <p:cNvGrpSpPr/>
+        <p:nvPr/>
+      </p:nvGrpSpPr>
+      <p:grpSpPr>
+        <a:xfrm>
+          <a:off x="0" y="0"/>
+          <a:ext cx="0" cy="0"/>
+          <a:chOff x="0" y="0"/>
+          <a:chExt cx="0" cy="0"/>
+        </a:xfrm>
+      </p:grpSpPr>
+      <p:sp>
+        <p:nvSpPr>
+          <p:cNvPr id="2" name="Title 1">
+            <a:extLst>
+              <a:ext uri="{FF2B5EF4-FFF2-40B4-BE49-F238E27FC236}">
+                <a16:creationId xmlns:a16="http://schemas.microsoft.com/office/drawing/2014/main" id="{824D5CE3-A749-99B3-9544-FED368B1EFD0}"/>
+              </a:ext>
+            </a:extLst>
+          </p:cNvPr>
+          <p:cNvSpPr>
+            <a:spLocks noGrp="1"/>
+          </p:cNvSpPr>
+          <p:nvPr>
+            <p:ph type="title"/>
+          </p:nvPr>
+        </p:nvSpPr>
+        <p:spPr>
+          <a:xfrm>
+            <a:off x="838200" y="365126"/>
+            <a:ext cx="10515600" cy="407232"/>
+          </a:xfrm>
+        </p:spPr>
+        <p:txBody>
+          <a:bodyPr>
+            <a:normAutofit/>
+          </a:bodyPr>
+          <a:lstStyle/>
+          <a:p>
+            <a:pPr algn="ctr"/>
+            <a:r>
+              <a:rPr lang="en-US" sz="2000" b="1" dirty="0"/>
+              <a:t>String, String Buffer ,String Builder</a:t>
+            </a:r>
+            <a:endParaRPr lang="en-IN" sz="2000" b="1" dirty="0"/>
+          </a:p>
+        </p:txBody>
+      </p:sp>
+      <p:graphicFrame>
+        <p:nvGraphicFramePr>
+          <p:cNvPr id="4" name="Table 4">
+            <a:extLst>
+              <a:ext uri="{FF2B5EF4-FFF2-40B4-BE49-F238E27FC236}">
+                <a16:creationId xmlns:a16="http://schemas.microsoft.com/office/drawing/2014/main" id="{A1F014A3-53A1-019D-1448-C01C53D14DAC}"/>
+              </a:ext>
+            </a:extLst>
+          </p:cNvPr>
+          <p:cNvGraphicFramePr>
+            <a:graphicFrameLocks noGrp="1"/>
+          </p:cNvGraphicFramePr>
+          <p:nvPr>
+            <p:ph idx="1"/>
+            <p:extLst>
+              <p:ext uri="{D42A27DB-BD31-4B8C-83A1-F6EECF244321}">
+                <p14:modId xmlns:p14="http://schemas.microsoft.com/office/powerpoint/2010/main" val="3847156892"/>
+              </p:ext>
+            </p:extLst>
+          </p:nvPr>
+        </p:nvGraphicFramePr>
+        <p:xfrm>
+          <a:off x="918100" y="772358"/>
+          <a:ext cx="9965925" cy="6011202"/>
+        </p:xfrm>
+        <a:graphic>
+          <a:graphicData uri="http://schemas.openxmlformats.org/drawingml/2006/table">
+            <a:tbl>
+              <a:tblPr firstRow="1" bandRow="1">
+                <a:tableStyleId>{5C22544A-7EE6-4342-B048-85BDC9FD1C3A}</a:tableStyleId>
+              </a:tblPr>
+              <a:tblGrid>
+                <a:gridCol w="3321975">
+                  <a:extLst>
+                    <a:ext uri="{9D8B030D-6E8A-4147-A177-3AD203B41FA5}">
+                      <a16:colId xmlns:a16="http://schemas.microsoft.com/office/drawing/2014/main" val="3425101313"/>
+                    </a:ext>
+                  </a:extLst>
+                </a:gridCol>
+                <a:gridCol w="3321975">
+                  <a:extLst>
+                    <a:ext uri="{9D8B030D-6E8A-4147-A177-3AD203B41FA5}">
+                      <a16:colId xmlns:a16="http://schemas.microsoft.com/office/drawing/2014/main" val="1683869864"/>
+                    </a:ext>
+                  </a:extLst>
+                </a:gridCol>
+                <a:gridCol w="3321975">
+                  <a:extLst>
+                    <a:ext uri="{9D8B030D-6E8A-4147-A177-3AD203B41FA5}">
+                      <a16:colId xmlns:a16="http://schemas.microsoft.com/office/drawing/2014/main" val="3220010055"/>
+                    </a:ext>
+                  </a:extLst>
+                </a:gridCol>
+              </a:tblGrid>
+              <a:tr h="318536">
+                <a:tc>
+                  <a:txBody>
+                    <a:bodyPr/>
+                    <a:lstStyle/>
+                    <a:p>
+                      <a:pPr algn="ctr"/>
+                      <a:r>
+                        <a:rPr lang="en-US" dirty="0"/>
+                        <a:t>String </a:t>
+                      </a:r>
+                      <a:endParaRPr lang="en-IN" dirty="0"/>
+                    </a:p>
+                  </a:txBody>
+                  <a:tcPr/>
+                </a:tc>
+                <a:tc>
+                  <a:txBody>
+                    <a:bodyPr/>
+                    <a:lstStyle/>
+                    <a:p>
+                      <a:pPr algn="ctr"/>
+                      <a:r>
+                        <a:rPr lang="en-US" dirty="0"/>
+                        <a:t>String Buffer</a:t>
+                      </a:r>
+                      <a:endParaRPr lang="en-IN" dirty="0"/>
+                    </a:p>
+                  </a:txBody>
+                  <a:tcPr/>
+                </a:tc>
+                <a:tc>
+                  <a:txBody>
+                    <a:bodyPr/>
+                    <a:lstStyle/>
+                    <a:p>
+                      <a:pPr algn="ctr"/>
+                      <a:r>
+                        <a:rPr lang="en-US" dirty="0"/>
+                        <a:t>String Builder</a:t>
+                      </a:r>
+                      <a:endParaRPr lang="en-IN" dirty="0"/>
+                    </a:p>
+                  </a:txBody>
+                  <a:tcPr/>
+                </a:tc>
+                <a:extLst>
+                  <a:ext uri="{0D108BD9-81ED-4DB2-BD59-A6C34878D82A}">
+                    <a16:rowId xmlns:a16="http://schemas.microsoft.com/office/drawing/2014/main" val="1142740357"/>
+                  </a:ext>
+                </a:extLst>
+              </a:tr>
+              <a:tr h="318536">
+                <a:tc>
+                  <a:txBody>
+                    <a:bodyPr/>
+                    <a:lstStyle/>
+                    <a:p>
+                      <a:pPr algn="ctr"/>
+                      <a:r>
+                        <a:rPr lang="en-US" dirty="0"/>
+                        <a:t>String are stored in String constant pool</a:t>
+                      </a:r>
+                      <a:endParaRPr lang="en-IN" dirty="0"/>
+                    </a:p>
+                  </a:txBody>
+                  <a:tcPr/>
+                </a:tc>
+                <a:tc>
+                  <a:txBody>
+                    <a:bodyPr/>
+                    <a:lstStyle/>
+                    <a:p>
+                      <a:pPr algn="ctr"/>
+                      <a:r>
+                        <a:rPr lang="en-US" dirty="0"/>
+                        <a:t>Store in heap memory</a:t>
+                      </a:r>
+                      <a:endParaRPr lang="en-IN" dirty="0"/>
+                    </a:p>
+                  </a:txBody>
+                  <a:tcPr/>
+                </a:tc>
+                <a:tc>
+                  <a:txBody>
+                    <a:bodyPr/>
+                    <a:lstStyle/>
+                    <a:p>
+                      <a:pPr marL="0" marR="0" lvl="0" indent="0" algn="ctr" defTabSz="914400" rtl="0" eaLnBrk="1" fontAlgn="auto" latinLnBrk="0" hangingPunct="1">
+                        <a:lnSpc>
+                          <a:spcPct val="100000"/>
+                        </a:lnSpc>
+                        <a:spcBef>
+                          <a:spcPts val="0"/>
+                        </a:spcBef>
+                        <a:spcAft>
+                          <a:spcPts val="0"/>
+                        </a:spcAft>
+                        <a:buClrTx/>
+                        <a:buSzTx/>
+                        <a:buFontTx/>
+                        <a:buNone/>
+                        <a:tabLst/>
+                        <a:defRPr/>
+                      </a:pPr>
+                      <a:r>
+                        <a:rPr lang="en-US" dirty="0"/>
+                        <a:t>Store in heap memory</a:t>
+                      </a:r>
+                      <a:endParaRPr lang="en-IN" dirty="0"/>
+                    </a:p>
+                    <a:p>
+                      <a:pPr algn="ctr"/>
+                      <a:endParaRPr lang="en-IN" dirty="0"/>
+                    </a:p>
+                  </a:txBody>
+                  <a:tcPr/>
+                </a:tc>
+                <a:extLst>
+                  <a:ext uri="{0D108BD9-81ED-4DB2-BD59-A6C34878D82A}">
+                    <a16:rowId xmlns:a16="http://schemas.microsoft.com/office/drawing/2014/main" val="3560707859"/>
+                  </a:ext>
+                </a:extLst>
+              </a:tr>
+              <a:tr h="318536">
+                <a:tc>
+                  <a:txBody>
+                    <a:bodyPr/>
+                    <a:lstStyle/>
+                    <a:p>
+                      <a:pPr algn="ctr"/>
+                      <a:r>
+                        <a:rPr lang="en-US" dirty="0"/>
+                        <a:t>Used in </a:t>
+                      </a:r>
+                      <a:r>
+                        <a:rPr lang="en-US" dirty="0" err="1"/>
+                        <a:t>constants,keys</a:t>
+                      </a:r>
+                      <a:r>
+                        <a:rPr lang="en-US" dirty="0"/>
+                        <a:t> s in Collection concept</a:t>
+                      </a:r>
+                      <a:endParaRPr lang="en-IN" dirty="0"/>
+                    </a:p>
+                  </a:txBody>
+                  <a:tcPr/>
+                </a:tc>
+                <a:tc>
+                  <a:txBody>
+                    <a:bodyPr/>
+                    <a:lstStyle/>
+                    <a:p>
+                      <a:pPr algn="l"/>
+                      <a:r>
+                        <a:rPr lang="en-US" dirty="0"/>
+                        <a:t>Building complex String, frequent modification</a:t>
+                      </a:r>
+                      <a:endParaRPr lang="en-IN" dirty="0"/>
+                    </a:p>
+                  </a:txBody>
+                  <a:tcPr/>
+                </a:tc>
+                <a:tc>
+                  <a:txBody>
+                    <a:bodyPr/>
+                    <a:lstStyle/>
+                    <a:p>
+                      <a:pPr marL="0" marR="0" lvl="0" indent="0" algn="l" defTabSz="914400" rtl="0" eaLnBrk="1" fontAlgn="auto" latinLnBrk="0" hangingPunct="1">
+                        <a:lnSpc>
+                          <a:spcPct val="100000"/>
+                        </a:lnSpc>
+                        <a:spcBef>
+                          <a:spcPts val="0"/>
+                        </a:spcBef>
+                        <a:spcAft>
+                          <a:spcPts val="0"/>
+                        </a:spcAft>
+                        <a:buClrTx/>
+                        <a:buSzTx/>
+                        <a:buFontTx/>
+                        <a:buNone/>
+                        <a:tabLst/>
+                        <a:defRPr/>
+                      </a:pPr>
+                      <a:r>
+                        <a:rPr lang="en-US" dirty="0"/>
+                        <a:t>Building complex String, frequent modification , Multithreading Environment.</a:t>
+                      </a:r>
+                      <a:endParaRPr lang="en-IN" dirty="0"/>
+                    </a:p>
+                    <a:p>
+                      <a:pPr marL="0" marR="0" lvl="0" indent="0" algn="ctr" defTabSz="914400" rtl="0" eaLnBrk="1" fontAlgn="auto" latinLnBrk="0" hangingPunct="1">
+                        <a:lnSpc>
+                          <a:spcPct val="100000"/>
+                        </a:lnSpc>
+                        <a:spcBef>
+                          <a:spcPts val="0"/>
+                        </a:spcBef>
+                        <a:spcAft>
+                          <a:spcPts val="0"/>
+                        </a:spcAft>
+                        <a:buClrTx/>
+                        <a:buSzTx/>
+                        <a:buFontTx/>
+                        <a:buNone/>
+                        <a:tabLst/>
+                        <a:defRPr/>
+                      </a:pPr>
+                      <a:endParaRPr lang="en-IN" dirty="0"/>
+                    </a:p>
+                  </a:txBody>
+                  <a:tcPr/>
+                </a:tc>
+                <a:extLst>
+                  <a:ext uri="{0D108BD9-81ED-4DB2-BD59-A6C34878D82A}">
+                    <a16:rowId xmlns:a16="http://schemas.microsoft.com/office/drawing/2014/main" val="3382898447"/>
+                  </a:ext>
+                </a:extLst>
+              </a:tr>
+              <a:tr h="796340">
+                <a:tc>
+                  <a:txBody>
+                    <a:bodyPr/>
+                    <a:lstStyle/>
+                    <a:p>
+                      <a:r>
+                        <a:rPr lang="en-US" dirty="0"/>
+                        <a:t>If our content is fixed and not changing frequently then we should go for String</a:t>
+                      </a:r>
+                      <a:endParaRPr lang="en-IN" dirty="0"/>
+                    </a:p>
+                  </a:txBody>
+                  <a:tcPr/>
+                </a:tc>
+                <a:tc>
+                  <a:txBody>
+                    <a:bodyPr/>
+                    <a:lstStyle/>
+                    <a:p>
+                      <a:pPr marL="0" marR="0" lvl="0" indent="0" algn="l" defTabSz="914400" rtl="0" eaLnBrk="1" fontAlgn="auto" latinLnBrk="0" hangingPunct="1">
+                        <a:lnSpc>
+                          <a:spcPct val="100000"/>
+                        </a:lnSpc>
+                        <a:spcBef>
+                          <a:spcPts val="0"/>
+                        </a:spcBef>
+                        <a:spcAft>
+                          <a:spcPts val="0"/>
+                        </a:spcAft>
+                        <a:buClrTx/>
+                        <a:buSzTx/>
+                        <a:buFontTx/>
+                        <a:buNone/>
+                        <a:tabLst/>
+                        <a:defRPr/>
+                      </a:pPr>
+                      <a:r>
+                        <a:rPr lang="en-US" dirty="0"/>
+                        <a:t>If our content is fixed as well as thread safety is required then we should go for String Buffer</a:t>
+                      </a:r>
+                      <a:endParaRPr lang="en-IN" dirty="0"/>
+                    </a:p>
+                  </a:txBody>
+                  <a:tcPr/>
+                </a:tc>
+                <a:tc>
+                  <a:txBody>
+                    <a:bodyPr/>
+                    <a:lstStyle/>
+                    <a:p>
+                      <a:pPr marL="0" marR="0" lvl="0" indent="0" algn="l" defTabSz="914400" rtl="0" eaLnBrk="1" fontAlgn="auto" latinLnBrk="0" hangingPunct="1">
+                        <a:lnSpc>
+                          <a:spcPct val="100000"/>
+                        </a:lnSpc>
+                        <a:spcBef>
+                          <a:spcPts val="0"/>
+                        </a:spcBef>
+                        <a:spcAft>
+                          <a:spcPts val="0"/>
+                        </a:spcAft>
+                        <a:buClrTx/>
+                        <a:buSzTx/>
+                        <a:buFontTx/>
+                        <a:buNone/>
+                        <a:tabLst/>
+                        <a:defRPr/>
+                      </a:pPr>
+                      <a:r>
+                        <a:rPr lang="en-US" dirty="0"/>
+                        <a:t>If our content is fixed as well as thread not safety is required then we should go for String Builder</a:t>
+                      </a:r>
+                      <a:endParaRPr lang="en-IN" dirty="0"/>
+                    </a:p>
+                    <a:p>
+                      <a:endParaRPr lang="en-IN" dirty="0"/>
+                    </a:p>
+                  </a:txBody>
+                  <a:tcPr/>
+                </a:tc>
+                <a:extLst>
+                  <a:ext uri="{0D108BD9-81ED-4DB2-BD59-A6C34878D82A}">
+                    <a16:rowId xmlns:a16="http://schemas.microsoft.com/office/drawing/2014/main" val="2801532861"/>
+                  </a:ext>
+                </a:extLst>
+              </a:tr>
+              <a:tr h="796340">
+                <a:tc>
+                  <a:txBody>
+                    <a:bodyPr/>
+                    <a:lstStyle/>
+                    <a:p>
+                      <a:endParaRPr lang="en-IN" dirty="0"/>
+                    </a:p>
+                  </a:txBody>
+                  <a:tcPr/>
+                </a:tc>
+                <a:tc>
+                  <a:txBody>
+                    <a:bodyPr/>
+                    <a:lstStyle/>
+                    <a:p>
+                      <a:endParaRPr lang="en-IN" dirty="0"/>
+                    </a:p>
+                  </a:txBody>
+                  <a:tcPr/>
+                </a:tc>
+                <a:tc>
+                  <a:txBody>
+                    <a:bodyPr/>
+                    <a:lstStyle/>
+                    <a:p>
+                      <a:endParaRPr lang="en-IN"/>
+                    </a:p>
+                  </a:txBody>
+                  <a:tcPr/>
+                </a:tc>
+                <a:extLst>
+                  <a:ext uri="{0D108BD9-81ED-4DB2-BD59-A6C34878D82A}">
+                    <a16:rowId xmlns:a16="http://schemas.microsoft.com/office/drawing/2014/main" val="3800285930"/>
+                  </a:ext>
+                </a:extLst>
+              </a:tr>
+              <a:tr h="1035242">
+                <a:tc>
+                  <a:txBody>
+                    <a:bodyPr/>
+                    <a:lstStyle/>
+                    <a:p>
+                      <a:endParaRPr lang="en-IN"/>
+                    </a:p>
+                  </a:txBody>
+                  <a:tcPr/>
+                </a:tc>
+                <a:tc>
+                  <a:txBody>
+                    <a:bodyPr/>
+                    <a:lstStyle/>
+                    <a:p>
+                      <a:endParaRPr lang="en-IN" dirty="0"/>
+                    </a:p>
+                  </a:txBody>
+                  <a:tcPr/>
+                </a:tc>
+                <a:tc>
+                  <a:txBody>
+                    <a:bodyPr/>
+                    <a:lstStyle/>
+                    <a:p>
+                      <a:pPr marL="0" marR="0" lvl="0" indent="0" algn="l" defTabSz="914400" rtl="0" eaLnBrk="1" fontAlgn="auto" latinLnBrk="0" hangingPunct="1">
+                        <a:lnSpc>
+                          <a:spcPct val="100000"/>
+                        </a:lnSpc>
+                        <a:spcBef>
+                          <a:spcPts val="0"/>
+                        </a:spcBef>
+                        <a:spcAft>
+                          <a:spcPts val="0"/>
+                        </a:spcAft>
+                        <a:buClrTx/>
+                        <a:buSzTx/>
+                        <a:buFontTx/>
+                        <a:buNone/>
+                        <a:tabLst/>
+                        <a:defRPr/>
+                      </a:pPr>
+                      <a:endParaRPr lang="en-IN" dirty="0"/>
+                    </a:p>
+                  </a:txBody>
+                  <a:tcPr/>
+                </a:tc>
+                <a:extLst>
+                  <a:ext uri="{0D108BD9-81ED-4DB2-BD59-A6C34878D82A}">
+                    <a16:rowId xmlns:a16="http://schemas.microsoft.com/office/drawing/2014/main" val="2160489687"/>
+                  </a:ext>
+                </a:extLst>
+              </a:tr>
+              <a:tr h="796340">
+                <a:tc>
+                  <a:txBody>
+                    <a:bodyPr/>
+                    <a:lstStyle/>
+                    <a:p>
+                      <a:endParaRPr lang="en-IN"/>
+                    </a:p>
+                  </a:txBody>
+                  <a:tcPr/>
+                </a:tc>
+                <a:tc>
+                  <a:txBody>
+                    <a:bodyPr/>
+                    <a:lstStyle/>
+                    <a:p>
+                      <a:endParaRPr lang="en-IN" dirty="0"/>
+                    </a:p>
+                  </a:txBody>
+                  <a:tcPr/>
+                </a:tc>
+                <a:tc>
+                  <a:txBody>
+                    <a:bodyPr/>
+                    <a:lstStyle/>
+                    <a:p>
+                      <a:endParaRPr lang="en-IN" dirty="0"/>
+                    </a:p>
+                  </a:txBody>
+                  <a:tcPr/>
+                </a:tc>
+                <a:extLst>
+                  <a:ext uri="{0D108BD9-81ED-4DB2-BD59-A6C34878D82A}">
+                    <a16:rowId xmlns:a16="http://schemas.microsoft.com/office/drawing/2014/main" val="461439749"/>
+                  </a:ext>
+                </a:extLst>
+              </a:tr>
+            </a:tbl>
+          </a:graphicData>
+        </a:graphic>
+      </p:graphicFrame>
+    </p:spTree>
+    <p:extLst>
+      <p:ext uri="{BB962C8B-B14F-4D97-AF65-F5344CB8AC3E}">
+        <p14:creationId xmlns:p14="http://schemas.microsoft.com/office/powerpoint/2010/main" val="1212223840"/>
+      </p:ext>
+    </p:extLst>
+  </p:cSld>
+  <p:clrMapOvr>
+    <a:masterClrMapping/>
+  </p:clrMapOvr>
+</p:sld>
+</file>
+
 <file path=ppt/theme/theme1.xml><?xml version="1.0" encoding="utf-8"?>
 <a:theme xmlns:a="http://schemas.openxmlformats.org/drawingml/2006/main" name="Office Theme">
   <a:themeElements>

</xml_diff>

<commit_message>
Packages Modifiers and Loops Collection Concept Completed.
</commit_message>
<xml_diff>
--- a/CoreJava/12_Miscellaenous/3_String/String_ppt.pptx
+++ b/CoreJava/12_Miscellaenous/3_String/String_ppt.pptx
@@ -5617,14 +5617,14 @@
             <p:ph idx="1"/>
             <p:extLst>
               <p:ext uri="{D42A27DB-BD31-4B8C-83A1-F6EECF244321}">
-                <p14:modId xmlns:p14="http://schemas.microsoft.com/office/powerpoint/2010/main" val="3847156892"/>
+                <p14:modId xmlns:p14="http://schemas.microsoft.com/office/powerpoint/2010/main" val="3484672112"/>
               </p:ext>
             </p:extLst>
           </p:nvPr>
         </p:nvGraphicFramePr>
         <p:xfrm>
           <a:off x="918100" y="772358"/>
-          <a:ext cx="9965925" cy="6011202"/>
+          <a:ext cx="9965925" cy="6285522"/>
         </p:xfrm>
         <a:graphic>
           <a:graphicData uri="http://schemas.openxmlformats.org/drawingml/2006/table">
@@ -5914,7 +5914,7 @@
                       </a:pPr>
                       <a:r>
                         <a:rPr lang="en-US" dirty="0"/>
-                        <a:t>If our content is fixed as well as thread safety is required then we should go for String Buffer</a:t>
+                        <a:t>If our content is not fixed as well as thread safety is required then we should go for String Buffer</a:t>
                       </a:r>
                       <a:endParaRPr lang="en-IN" dirty="0"/>
                     </a:p>
@@ -5945,7 +5945,7 @@
                       </a:pPr>
                       <a:r>
                         <a:rPr lang="en-US" dirty="0"/>
-                        <a:t>If our content is fixed as well as thread not safety is required then we should go for String Builder</a:t>
+                        <a:t>If our content is not  fixed as well as thread safety is not required then we should go for String Builder</a:t>
                       </a:r>
                       <a:endParaRPr lang="en-IN" dirty="0"/>
                     </a:p>

</xml_diff>